<commit_message>
create and load CC in SAle module
</commit_message>
<xml_diff>
--- a/resources/CC diagram.pptx
+++ b/resources/CC diagram.pptx
@@ -286,9 +286,9 @@
           <a:bodyPr/>
           <a:lstStyle/>
           <a:p>
-            <a:fld id="{4982EEBD-DA15-4065-9617-38159C3CB354}" type="datetimeFigureOut">
-              <a:rPr lang="en-US" smtClean="0"/>
-              <a:t>7/2/2022</a:t>
+            <a:fld id="{4483607E-5B90-40D2-8C76-16BEBD653E3F}" type="datetimeFigureOut">
+              <a:rPr lang="en-US" smtClean="0"/>
+              <a:t>8/19/2022</a:t>
             </a:fld>
             <a:endParaRPr lang="en-US"/>
           </a:p>
@@ -328,7 +328,7 @@
           <a:bodyPr/>
           <a:lstStyle/>
           <a:p>
-            <a:fld id="{1FF0BE83-D522-4455-81A5-EDC6C578C421}" type="slidenum">
+            <a:fld id="{B0AB66EC-CF4E-4501-A923-92578FF271CF}" type="slidenum">
               <a:rPr lang="en-US" smtClean="0"/>
               <a:t>‹#›</a:t>
             </a:fld>
@@ -339,7 +339,7 @@
     </p:spTree>
     <p:extLst>
       <p:ext uri="{BB962C8B-B14F-4D97-AF65-F5344CB8AC3E}">
-        <p14:creationId xmlns:p14="http://schemas.microsoft.com/office/powerpoint/2010/main" val="3990835402"/>
+        <p14:creationId xmlns:p14="http://schemas.microsoft.com/office/powerpoint/2010/main" val="336743342"/>
       </p:ext>
     </p:extLst>
   </p:cSld>
@@ -456,9 +456,9 @@
           <a:bodyPr/>
           <a:lstStyle/>
           <a:p>
-            <a:fld id="{4982EEBD-DA15-4065-9617-38159C3CB354}" type="datetimeFigureOut">
-              <a:rPr lang="en-US" smtClean="0"/>
-              <a:t>7/2/2022</a:t>
+            <a:fld id="{4483607E-5B90-40D2-8C76-16BEBD653E3F}" type="datetimeFigureOut">
+              <a:rPr lang="en-US" smtClean="0"/>
+              <a:t>8/19/2022</a:t>
             </a:fld>
             <a:endParaRPr lang="en-US"/>
           </a:p>
@@ -498,7 +498,7 @@
           <a:bodyPr/>
           <a:lstStyle/>
           <a:p>
-            <a:fld id="{1FF0BE83-D522-4455-81A5-EDC6C578C421}" type="slidenum">
+            <a:fld id="{B0AB66EC-CF4E-4501-A923-92578FF271CF}" type="slidenum">
               <a:rPr lang="en-US" smtClean="0"/>
               <a:t>‹#›</a:t>
             </a:fld>
@@ -509,7 +509,7 @@
     </p:spTree>
     <p:extLst>
       <p:ext uri="{BB962C8B-B14F-4D97-AF65-F5344CB8AC3E}">
-        <p14:creationId xmlns:p14="http://schemas.microsoft.com/office/powerpoint/2010/main" val="1367206953"/>
+        <p14:creationId xmlns:p14="http://schemas.microsoft.com/office/powerpoint/2010/main" val="918749854"/>
       </p:ext>
     </p:extLst>
   </p:cSld>
@@ -636,9 +636,9 @@
           <a:bodyPr/>
           <a:lstStyle/>
           <a:p>
-            <a:fld id="{4982EEBD-DA15-4065-9617-38159C3CB354}" type="datetimeFigureOut">
-              <a:rPr lang="en-US" smtClean="0"/>
-              <a:t>7/2/2022</a:t>
+            <a:fld id="{4483607E-5B90-40D2-8C76-16BEBD653E3F}" type="datetimeFigureOut">
+              <a:rPr lang="en-US" smtClean="0"/>
+              <a:t>8/19/2022</a:t>
             </a:fld>
             <a:endParaRPr lang="en-US"/>
           </a:p>
@@ -678,7 +678,7 @@
           <a:bodyPr/>
           <a:lstStyle/>
           <a:p>
-            <a:fld id="{1FF0BE83-D522-4455-81A5-EDC6C578C421}" type="slidenum">
+            <a:fld id="{B0AB66EC-CF4E-4501-A923-92578FF271CF}" type="slidenum">
               <a:rPr lang="en-US" smtClean="0"/>
               <a:t>‹#›</a:t>
             </a:fld>
@@ -689,7 +689,7 @@
     </p:spTree>
     <p:extLst>
       <p:ext uri="{BB962C8B-B14F-4D97-AF65-F5344CB8AC3E}">
-        <p14:creationId xmlns:p14="http://schemas.microsoft.com/office/powerpoint/2010/main" val="106732151"/>
+        <p14:creationId xmlns:p14="http://schemas.microsoft.com/office/powerpoint/2010/main" val="3379776579"/>
       </p:ext>
     </p:extLst>
   </p:cSld>
@@ -806,9 +806,9 @@
           <a:bodyPr/>
           <a:lstStyle/>
           <a:p>
-            <a:fld id="{4982EEBD-DA15-4065-9617-38159C3CB354}" type="datetimeFigureOut">
-              <a:rPr lang="en-US" smtClean="0"/>
-              <a:t>7/2/2022</a:t>
+            <a:fld id="{4483607E-5B90-40D2-8C76-16BEBD653E3F}" type="datetimeFigureOut">
+              <a:rPr lang="en-US" smtClean="0"/>
+              <a:t>8/19/2022</a:t>
             </a:fld>
             <a:endParaRPr lang="en-US"/>
           </a:p>
@@ -848,7 +848,7 @@
           <a:bodyPr/>
           <a:lstStyle/>
           <a:p>
-            <a:fld id="{1FF0BE83-D522-4455-81A5-EDC6C578C421}" type="slidenum">
+            <a:fld id="{B0AB66EC-CF4E-4501-A923-92578FF271CF}" type="slidenum">
               <a:rPr lang="en-US" smtClean="0"/>
               <a:t>‹#›</a:t>
             </a:fld>
@@ -859,7 +859,7 @@
     </p:spTree>
     <p:extLst>
       <p:ext uri="{BB962C8B-B14F-4D97-AF65-F5344CB8AC3E}">
-        <p14:creationId xmlns:p14="http://schemas.microsoft.com/office/powerpoint/2010/main" val="217395147"/>
+        <p14:creationId xmlns:p14="http://schemas.microsoft.com/office/powerpoint/2010/main" val="2715199477"/>
       </p:ext>
     </p:extLst>
   </p:cSld>
@@ -1052,9 +1052,9 @@
           <a:bodyPr/>
           <a:lstStyle/>
           <a:p>
-            <a:fld id="{4982EEBD-DA15-4065-9617-38159C3CB354}" type="datetimeFigureOut">
-              <a:rPr lang="en-US" smtClean="0"/>
-              <a:t>7/2/2022</a:t>
+            <a:fld id="{4483607E-5B90-40D2-8C76-16BEBD653E3F}" type="datetimeFigureOut">
+              <a:rPr lang="en-US" smtClean="0"/>
+              <a:t>8/19/2022</a:t>
             </a:fld>
             <a:endParaRPr lang="en-US"/>
           </a:p>
@@ -1094,7 +1094,7 @@
           <a:bodyPr/>
           <a:lstStyle/>
           <a:p>
-            <a:fld id="{1FF0BE83-D522-4455-81A5-EDC6C578C421}" type="slidenum">
+            <a:fld id="{B0AB66EC-CF4E-4501-A923-92578FF271CF}" type="slidenum">
               <a:rPr lang="en-US" smtClean="0"/>
               <a:t>‹#›</a:t>
             </a:fld>
@@ -1105,7 +1105,7 @@
     </p:spTree>
     <p:extLst>
       <p:ext uri="{BB962C8B-B14F-4D97-AF65-F5344CB8AC3E}">
-        <p14:creationId xmlns:p14="http://schemas.microsoft.com/office/powerpoint/2010/main" val="4053607120"/>
+        <p14:creationId xmlns:p14="http://schemas.microsoft.com/office/powerpoint/2010/main" val="1360782839"/>
       </p:ext>
     </p:extLst>
   </p:cSld>
@@ -1340,9 +1340,9 @@
           <a:bodyPr/>
           <a:lstStyle/>
           <a:p>
-            <a:fld id="{4982EEBD-DA15-4065-9617-38159C3CB354}" type="datetimeFigureOut">
-              <a:rPr lang="en-US" smtClean="0"/>
-              <a:t>7/2/2022</a:t>
+            <a:fld id="{4483607E-5B90-40D2-8C76-16BEBD653E3F}" type="datetimeFigureOut">
+              <a:rPr lang="en-US" smtClean="0"/>
+              <a:t>8/19/2022</a:t>
             </a:fld>
             <a:endParaRPr lang="en-US"/>
           </a:p>
@@ -1382,7 +1382,7 @@
           <a:bodyPr/>
           <a:lstStyle/>
           <a:p>
-            <a:fld id="{1FF0BE83-D522-4455-81A5-EDC6C578C421}" type="slidenum">
+            <a:fld id="{B0AB66EC-CF4E-4501-A923-92578FF271CF}" type="slidenum">
               <a:rPr lang="en-US" smtClean="0"/>
               <a:t>‹#›</a:t>
             </a:fld>
@@ -1393,7 +1393,7 @@
     </p:spTree>
     <p:extLst>
       <p:ext uri="{BB962C8B-B14F-4D97-AF65-F5344CB8AC3E}">
-        <p14:creationId xmlns:p14="http://schemas.microsoft.com/office/powerpoint/2010/main" val="1533365823"/>
+        <p14:creationId xmlns:p14="http://schemas.microsoft.com/office/powerpoint/2010/main" val="2197227245"/>
       </p:ext>
     </p:extLst>
   </p:cSld>
@@ -1762,9 +1762,9 @@
           <a:bodyPr/>
           <a:lstStyle/>
           <a:p>
-            <a:fld id="{4982EEBD-DA15-4065-9617-38159C3CB354}" type="datetimeFigureOut">
-              <a:rPr lang="en-US" smtClean="0"/>
-              <a:t>7/2/2022</a:t>
+            <a:fld id="{4483607E-5B90-40D2-8C76-16BEBD653E3F}" type="datetimeFigureOut">
+              <a:rPr lang="en-US" smtClean="0"/>
+              <a:t>8/19/2022</a:t>
             </a:fld>
             <a:endParaRPr lang="en-US"/>
           </a:p>
@@ -1804,7 +1804,7 @@
           <a:bodyPr/>
           <a:lstStyle/>
           <a:p>
-            <a:fld id="{1FF0BE83-D522-4455-81A5-EDC6C578C421}" type="slidenum">
+            <a:fld id="{B0AB66EC-CF4E-4501-A923-92578FF271CF}" type="slidenum">
               <a:rPr lang="en-US" smtClean="0"/>
               <a:t>‹#›</a:t>
             </a:fld>
@@ -1815,7 +1815,7 @@
     </p:spTree>
     <p:extLst>
       <p:ext uri="{BB962C8B-B14F-4D97-AF65-F5344CB8AC3E}">
-        <p14:creationId xmlns:p14="http://schemas.microsoft.com/office/powerpoint/2010/main" val="2816728840"/>
+        <p14:creationId xmlns:p14="http://schemas.microsoft.com/office/powerpoint/2010/main" val="3020149419"/>
       </p:ext>
     </p:extLst>
   </p:cSld>
@@ -1880,9 +1880,9 @@
           <a:bodyPr/>
           <a:lstStyle/>
           <a:p>
-            <a:fld id="{4982EEBD-DA15-4065-9617-38159C3CB354}" type="datetimeFigureOut">
-              <a:rPr lang="en-US" smtClean="0"/>
-              <a:t>7/2/2022</a:t>
+            <a:fld id="{4483607E-5B90-40D2-8C76-16BEBD653E3F}" type="datetimeFigureOut">
+              <a:rPr lang="en-US" smtClean="0"/>
+              <a:t>8/19/2022</a:t>
             </a:fld>
             <a:endParaRPr lang="en-US"/>
           </a:p>
@@ -1922,7 +1922,7 @@
           <a:bodyPr/>
           <a:lstStyle/>
           <a:p>
-            <a:fld id="{1FF0BE83-D522-4455-81A5-EDC6C578C421}" type="slidenum">
+            <a:fld id="{B0AB66EC-CF4E-4501-A923-92578FF271CF}" type="slidenum">
               <a:rPr lang="en-US" smtClean="0"/>
               <a:t>‹#›</a:t>
             </a:fld>
@@ -1933,7 +1933,7 @@
     </p:spTree>
     <p:extLst>
       <p:ext uri="{BB962C8B-B14F-4D97-AF65-F5344CB8AC3E}">
-        <p14:creationId xmlns:p14="http://schemas.microsoft.com/office/powerpoint/2010/main" val="2385372519"/>
+        <p14:creationId xmlns:p14="http://schemas.microsoft.com/office/powerpoint/2010/main" val="3520151919"/>
       </p:ext>
     </p:extLst>
   </p:cSld>
@@ -1975,9 +1975,9 @@
           <a:bodyPr/>
           <a:lstStyle/>
           <a:p>
-            <a:fld id="{4982EEBD-DA15-4065-9617-38159C3CB354}" type="datetimeFigureOut">
-              <a:rPr lang="en-US" smtClean="0"/>
-              <a:t>7/2/2022</a:t>
+            <a:fld id="{4483607E-5B90-40D2-8C76-16BEBD653E3F}" type="datetimeFigureOut">
+              <a:rPr lang="en-US" smtClean="0"/>
+              <a:t>8/19/2022</a:t>
             </a:fld>
             <a:endParaRPr lang="en-US"/>
           </a:p>
@@ -2017,7 +2017,7 @@
           <a:bodyPr/>
           <a:lstStyle/>
           <a:p>
-            <a:fld id="{1FF0BE83-D522-4455-81A5-EDC6C578C421}" type="slidenum">
+            <a:fld id="{B0AB66EC-CF4E-4501-A923-92578FF271CF}" type="slidenum">
               <a:rPr lang="en-US" smtClean="0"/>
               <a:t>‹#›</a:t>
             </a:fld>
@@ -2028,7 +2028,7 @@
     </p:spTree>
     <p:extLst>
       <p:ext uri="{BB962C8B-B14F-4D97-AF65-F5344CB8AC3E}">
-        <p14:creationId xmlns:p14="http://schemas.microsoft.com/office/powerpoint/2010/main" val="2279328434"/>
+        <p14:creationId xmlns:p14="http://schemas.microsoft.com/office/powerpoint/2010/main" val="3283678497"/>
       </p:ext>
     </p:extLst>
   </p:cSld>
@@ -2252,9 +2252,9 @@
           <a:bodyPr/>
           <a:lstStyle/>
           <a:p>
-            <a:fld id="{4982EEBD-DA15-4065-9617-38159C3CB354}" type="datetimeFigureOut">
-              <a:rPr lang="en-US" smtClean="0"/>
-              <a:t>7/2/2022</a:t>
+            <a:fld id="{4483607E-5B90-40D2-8C76-16BEBD653E3F}" type="datetimeFigureOut">
+              <a:rPr lang="en-US" smtClean="0"/>
+              <a:t>8/19/2022</a:t>
             </a:fld>
             <a:endParaRPr lang="en-US"/>
           </a:p>
@@ -2294,7 +2294,7 @@
           <a:bodyPr/>
           <a:lstStyle/>
           <a:p>
-            <a:fld id="{1FF0BE83-D522-4455-81A5-EDC6C578C421}" type="slidenum">
+            <a:fld id="{B0AB66EC-CF4E-4501-A923-92578FF271CF}" type="slidenum">
               <a:rPr lang="en-US" smtClean="0"/>
               <a:t>‹#›</a:t>
             </a:fld>
@@ -2305,7 +2305,7 @@
     </p:spTree>
     <p:extLst>
       <p:ext uri="{BB962C8B-B14F-4D97-AF65-F5344CB8AC3E}">
-        <p14:creationId xmlns:p14="http://schemas.microsoft.com/office/powerpoint/2010/main" val="3899494255"/>
+        <p14:creationId xmlns:p14="http://schemas.microsoft.com/office/powerpoint/2010/main" val="1038647044"/>
       </p:ext>
     </p:extLst>
   </p:cSld>
@@ -2505,9 +2505,9 @@
           <a:bodyPr/>
           <a:lstStyle/>
           <a:p>
-            <a:fld id="{4982EEBD-DA15-4065-9617-38159C3CB354}" type="datetimeFigureOut">
-              <a:rPr lang="en-US" smtClean="0"/>
-              <a:t>7/2/2022</a:t>
+            <a:fld id="{4483607E-5B90-40D2-8C76-16BEBD653E3F}" type="datetimeFigureOut">
+              <a:rPr lang="en-US" smtClean="0"/>
+              <a:t>8/19/2022</a:t>
             </a:fld>
             <a:endParaRPr lang="en-US"/>
           </a:p>
@@ -2547,7 +2547,7 @@
           <a:bodyPr/>
           <a:lstStyle/>
           <a:p>
-            <a:fld id="{1FF0BE83-D522-4455-81A5-EDC6C578C421}" type="slidenum">
+            <a:fld id="{B0AB66EC-CF4E-4501-A923-92578FF271CF}" type="slidenum">
               <a:rPr lang="en-US" smtClean="0"/>
               <a:t>‹#›</a:t>
             </a:fld>
@@ -2558,7 +2558,7 @@
     </p:spTree>
     <p:extLst>
       <p:ext uri="{BB962C8B-B14F-4D97-AF65-F5344CB8AC3E}">
-        <p14:creationId xmlns:p14="http://schemas.microsoft.com/office/powerpoint/2010/main" val="1278630676"/>
+        <p14:creationId xmlns:p14="http://schemas.microsoft.com/office/powerpoint/2010/main" val="1364644512"/>
       </p:ext>
     </p:extLst>
   </p:cSld>
@@ -2718,9 +2718,9 @@
             </a:lvl1pPr>
           </a:lstStyle>
           <a:p>
-            <a:fld id="{4982EEBD-DA15-4065-9617-38159C3CB354}" type="datetimeFigureOut">
-              <a:rPr lang="en-US" smtClean="0"/>
-              <a:t>7/2/2022</a:t>
+            <a:fld id="{4483607E-5B90-40D2-8C76-16BEBD653E3F}" type="datetimeFigureOut">
+              <a:rPr lang="en-US" smtClean="0"/>
+              <a:t>8/19/2022</a:t>
             </a:fld>
             <a:endParaRPr lang="en-US"/>
           </a:p>
@@ -2796,7 +2796,7 @@
             </a:lvl1pPr>
           </a:lstStyle>
           <a:p>
-            <a:fld id="{1FF0BE83-D522-4455-81A5-EDC6C578C421}" type="slidenum">
+            <a:fld id="{B0AB66EC-CF4E-4501-A923-92578FF271CF}" type="slidenum">
               <a:rPr lang="en-US" smtClean="0"/>
               <a:t>‹#›</a:t>
             </a:fld>
@@ -2807,7 +2807,7 @@
     </p:spTree>
     <p:extLst>
       <p:ext uri="{BB962C8B-B14F-4D97-AF65-F5344CB8AC3E}">
-        <p14:creationId xmlns:p14="http://schemas.microsoft.com/office/powerpoint/2010/main" val="2825685289"/>
+        <p14:creationId xmlns:p14="http://schemas.microsoft.com/office/powerpoint/2010/main" val="2232129938"/>
       </p:ext>
     </p:extLst>
   </p:cSld>
@@ -3097,16 +3097,16 @@
       </p:grpSpPr>
       <p:sp>
         <p:nvSpPr>
-          <p:cNvPr id="4" name="Oval 3"/>
+          <p:cNvPr id="4" name="Rectangle 3"/>
           <p:cNvSpPr/>
           <p:nvPr/>
         </p:nvSpPr>
         <p:spPr>
           <a:xfrm>
-            <a:off x="381000" y="533400"/>
-            <a:ext cx="1447800" cy="762000"/>
-          </a:xfrm>
-          <a:prstGeom prst="ellipse">
+            <a:off x="3439886" y="674914"/>
+            <a:ext cx="2590800" cy="609600"/>
+          </a:xfrm>
+          <a:prstGeom prst="rect">
             <a:avLst/>
           </a:prstGeom>
         </p:spPr>
@@ -3132,25 +3132,31 @@
           <a:p>
             <a:pPr algn="ctr"/>
             <a:r>
-              <a:rPr lang="en-US" b="1" dirty="0" smtClean="0"/>
-              <a:t>Begin</a:t>
-            </a:r>
-            <a:endParaRPr lang="en-US" b="1" dirty="0"/>
-          </a:p>
-        </p:txBody>
-      </p:sp>
-      <p:sp>
-        <p:nvSpPr>
-          <p:cNvPr id="5" name="Oval 4"/>
+              <a:rPr lang="en-US" b="1" dirty="0" smtClean="0">
+                <a:latin typeface="Times New Roman" pitchFamily="18" charset="0"/>
+                <a:cs typeface="Times New Roman" pitchFamily="18" charset="0"/>
+              </a:rPr>
+              <a:t>JOB</a:t>
+            </a:r>
+            <a:endParaRPr lang="en-US" b="1" dirty="0">
+              <a:latin typeface="Times New Roman" pitchFamily="18" charset="0"/>
+              <a:cs typeface="Times New Roman" pitchFamily="18" charset="0"/>
+            </a:endParaRPr>
+          </a:p>
+        </p:txBody>
+      </p:sp>
+      <p:sp>
+        <p:nvSpPr>
+          <p:cNvPr id="5" name="Rectangle 4"/>
           <p:cNvSpPr/>
           <p:nvPr/>
         </p:nvSpPr>
         <p:spPr>
           <a:xfrm>
-            <a:off x="6477000" y="5785757"/>
-            <a:ext cx="1447800" cy="762000"/>
-          </a:xfrm>
-          <a:prstGeom prst="ellipse">
+            <a:off x="914400" y="1905000"/>
+            <a:ext cx="1828800" cy="609600"/>
+          </a:xfrm>
+          <a:prstGeom prst="rect">
             <a:avLst/>
           </a:prstGeom>
         </p:spPr>
@@ -3176,25 +3182,31 @@
           <a:p>
             <a:pPr algn="ctr"/>
             <a:r>
-              <a:rPr lang="en-US" b="1" dirty="0" smtClean="0"/>
-              <a:t>End</a:t>
-            </a:r>
-            <a:endParaRPr lang="en-US" b="1" dirty="0"/>
-          </a:p>
-        </p:txBody>
-      </p:sp>
-      <p:sp>
-        <p:nvSpPr>
-          <p:cNvPr id="6" name="Diamond 5"/>
+              <a:rPr lang="en-US" b="1" dirty="0" smtClean="0">
+                <a:latin typeface="Times New Roman" pitchFamily="18" charset="0"/>
+                <a:cs typeface="Times New Roman" pitchFamily="18" charset="0"/>
+              </a:rPr>
+              <a:t>CC add</a:t>
+            </a:r>
+            <a:endParaRPr lang="en-US" b="1" dirty="0">
+              <a:latin typeface="Times New Roman" pitchFamily="18" charset="0"/>
+              <a:cs typeface="Times New Roman" pitchFamily="18" charset="0"/>
+            </a:endParaRPr>
+          </a:p>
+        </p:txBody>
+      </p:sp>
+      <p:sp>
+        <p:nvSpPr>
+          <p:cNvPr id="6" name="Rectangle 5"/>
           <p:cNvSpPr/>
           <p:nvPr/>
         </p:nvSpPr>
         <p:spPr>
           <a:xfrm>
-            <a:off x="190500" y="2035629"/>
-            <a:ext cx="1828800" cy="838200"/>
-          </a:xfrm>
-          <a:prstGeom prst="diamond">
+            <a:off x="3820886" y="1894114"/>
+            <a:ext cx="1828800" cy="609600"/>
+          </a:xfrm>
+          <a:prstGeom prst="rect">
             <a:avLst/>
           </a:prstGeom>
         </p:spPr>
@@ -3220,26 +3232,110 @@
           <a:p>
             <a:pPr algn="ctr"/>
             <a:r>
-              <a:rPr lang="en-US" b="1" dirty="0" err="1" smtClean="0"/>
-              <a:t>Refix</a:t>
-            </a:r>
-            <a:endParaRPr lang="en-US" b="1" dirty="0"/>
+              <a:rPr lang="en-US" b="1" dirty="0" smtClean="0">
+                <a:latin typeface="Times New Roman" pitchFamily="18" charset="0"/>
+                <a:cs typeface="Times New Roman" pitchFamily="18" charset="0"/>
+              </a:rPr>
+              <a:t>CC </a:t>
+            </a:r>
+            <a:r>
+              <a:rPr lang="en-US" b="1" dirty="0" err="1">
+                <a:latin typeface="Times New Roman" pitchFamily="18" charset="0"/>
+                <a:cs typeface="Times New Roman" pitchFamily="18" charset="0"/>
+              </a:rPr>
+              <a:t>r</a:t>
+            </a:r>
+            <a:r>
+              <a:rPr lang="en-US" b="1" dirty="0" err="1" smtClean="0">
+                <a:latin typeface="Times New Roman" pitchFamily="18" charset="0"/>
+                <a:cs typeface="Times New Roman" pitchFamily="18" charset="0"/>
+              </a:rPr>
+              <a:t>efix</a:t>
+            </a:r>
+            <a:endParaRPr lang="en-US" b="1" dirty="0">
+              <a:latin typeface="Times New Roman" pitchFamily="18" charset="0"/>
+              <a:cs typeface="Times New Roman" pitchFamily="18" charset="0"/>
+            </a:endParaRPr>
+          </a:p>
+        </p:txBody>
+      </p:sp>
+      <p:sp>
+        <p:nvSpPr>
+          <p:cNvPr id="8" name="Rectangle 7"/>
+          <p:cNvSpPr/>
+          <p:nvPr/>
+        </p:nvSpPr>
+        <p:spPr>
+          <a:xfrm>
+            <a:off x="6248400" y="1894114"/>
+            <a:ext cx="1828800" cy="609600"/>
+          </a:xfrm>
+          <a:prstGeom prst="rect">
+            <a:avLst/>
+          </a:prstGeom>
+        </p:spPr>
+        <p:style>
+          <a:lnRef idx="2">
+            <a:schemeClr val="accent1">
+              <a:shade val="50000"/>
+            </a:schemeClr>
+          </a:lnRef>
+          <a:fillRef idx="1">
+            <a:schemeClr val="accent1"/>
+          </a:fillRef>
+          <a:effectRef idx="0">
+            <a:schemeClr val="accent1"/>
+          </a:effectRef>
+          <a:fontRef idx="minor">
+            <a:schemeClr val="lt1"/>
+          </a:fontRef>
+        </p:style>
+        <p:txBody>
+          <a:bodyPr rtlCol="0" anchor="ctr"/>
+          <a:lstStyle/>
+          <a:p>
+            <a:pPr algn="ctr"/>
+            <a:r>
+              <a:rPr lang="en-US" b="1" dirty="0" smtClean="0">
+                <a:latin typeface="Times New Roman" pitchFamily="18" charset="0"/>
+                <a:cs typeface="Times New Roman" pitchFamily="18" charset="0"/>
+              </a:rPr>
+              <a:t>CC </a:t>
+            </a:r>
+            <a:r>
+              <a:rPr lang="en-US" b="1" dirty="0" err="1" smtClean="0">
+                <a:latin typeface="Times New Roman" pitchFamily="18" charset="0"/>
+                <a:cs typeface="Times New Roman" pitchFamily="18" charset="0"/>
+              </a:rPr>
+              <a:t>refix</a:t>
+            </a:r>
+            <a:r>
+              <a:rPr lang="en-US" b="1" dirty="0" smtClean="0">
+                <a:latin typeface="Times New Roman" pitchFamily="18" charset="0"/>
+                <a:cs typeface="Times New Roman" pitchFamily="18" charset="0"/>
+              </a:rPr>
+              <a:t> task</a:t>
+            </a:r>
+            <a:endParaRPr lang="en-US" b="1" dirty="0">
+              <a:latin typeface="Times New Roman" pitchFamily="18" charset="0"/>
+              <a:cs typeface="Times New Roman" pitchFamily="18" charset="0"/>
+            </a:endParaRPr>
           </a:p>
         </p:txBody>
       </p:sp>
       <p:cxnSp>
         <p:nvCxnSpPr>
-          <p:cNvPr id="8" name="Straight Arrow Connector 7"/>
+          <p:cNvPr id="10" name="Straight Arrow Connector 9"/>
           <p:cNvCxnSpPr>
-            <a:stCxn id="4" idx="4"/>
-            <a:endCxn id="6" idx="0"/>
+            <a:stCxn id="5" idx="0"/>
+            <a:endCxn id="4" idx="2"/>
           </p:cNvCxnSpPr>
           <p:nvPr/>
         </p:nvCxnSpPr>
         <p:spPr>
-          <a:xfrm>
-            <a:off x="1104900" y="1295400"/>
-            <a:ext cx="0" cy="740229"/>
+          <a:xfrm flipV="1">
+            <a:off x="1828800" y="1284514"/>
+            <a:ext cx="2906486" cy="620486"/>
           </a:xfrm>
           <a:prstGeom prst="straightConnector1">
             <a:avLst/>
@@ -3265,17 +3361,17 @@
       </p:cxnSp>
       <p:cxnSp>
         <p:nvCxnSpPr>
-          <p:cNvPr id="10" name="Straight Arrow Connector 9"/>
+          <p:cNvPr id="12" name="Straight Arrow Connector 11"/>
           <p:cNvCxnSpPr>
-            <a:stCxn id="6" idx="3"/>
-            <a:endCxn id="15" idx="1"/>
+            <a:stCxn id="6" idx="0"/>
+            <a:endCxn id="4" idx="2"/>
           </p:cNvCxnSpPr>
           <p:nvPr/>
         </p:nvCxnSpPr>
         <p:spPr>
           <a:xfrm flipV="1">
-            <a:off x="2019300" y="2449286"/>
-            <a:ext cx="952500" cy="5443"/>
+            <a:off x="4735286" y="1284514"/>
+            <a:ext cx="0" cy="609600"/>
           </a:xfrm>
           <a:prstGeom prst="straightConnector1">
             <a:avLst/>
@@ -3301,217 +3397,17 @@
       </p:cxnSp>
       <p:cxnSp>
         <p:nvCxnSpPr>
-          <p:cNvPr id="11" name="Straight Arrow Connector 10"/>
+          <p:cNvPr id="14" name="Straight Arrow Connector 13"/>
           <p:cNvCxnSpPr>
-            <a:stCxn id="6" idx="2"/>
-            <a:endCxn id="32" idx="0"/>
+            <a:stCxn id="8" idx="0"/>
+            <a:endCxn id="4" idx="2"/>
           </p:cNvCxnSpPr>
           <p:nvPr/>
         </p:nvCxnSpPr>
         <p:spPr>
-          <a:xfrm flipH="1">
-            <a:off x="1094014" y="2873829"/>
-            <a:ext cx="10886" cy="707571"/>
-          </a:xfrm>
-          <a:prstGeom prst="straightConnector1">
-            <a:avLst/>
-          </a:prstGeom>
-          <a:ln>
-            <a:tailEnd type="arrow"/>
-          </a:ln>
-        </p:spPr>
-        <p:style>
-          <a:lnRef idx="1">
-            <a:schemeClr val="accent1"/>
-          </a:lnRef>
-          <a:fillRef idx="0">
-            <a:schemeClr val="accent1"/>
-          </a:fillRef>
-          <a:effectRef idx="0">
-            <a:schemeClr val="accent1"/>
-          </a:effectRef>
-          <a:fontRef idx="minor">
-            <a:schemeClr val="tx1"/>
-          </a:fontRef>
-        </p:style>
-      </p:cxnSp>
-      <p:sp>
-        <p:nvSpPr>
-          <p:cNvPr id="15" name="Rectangle 14"/>
-          <p:cNvSpPr/>
-          <p:nvPr/>
-        </p:nvSpPr>
-        <p:spPr>
-          <a:xfrm>
-            <a:off x="2971800" y="2068286"/>
-            <a:ext cx="2133600" cy="762000"/>
-          </a:xfrm>
-          <a:prstGeom prst="rect">
-            <a:avLst/>
-          </a:prstGeom>
-        </p:spPr>
-        <p:style>
-          <a:lnRef idx="2">
-            <a:schemeClr val="accent1">
-              <a:shade val="50000"/>
-            </a:schemeClr>
-          </a:lnRef>
-          <a:fillRef idx="1">
-            <a:schemeClr val="accent1"/>
-          </a:fillRef>
-          <a:effectRef idx="0">
-            <a:schemeClr val="accent1"/>
-          </a:effectRef>
-          <a:fontRef idx="minor">
-            <a:schemeClr val="lt1"/>
-          </a:fontRef>
-        </p:style>
-        <p:txBody>
-          <a:bodyPr rtlCol="0" anchor="ctr"/>
-          <a:lstStyle/>
-          <a:p>
-            <a:pPr algn="ctr"/>
-            <a:r>
-              <a:rPr lang="en-US" dirty="0" smtClean="0"/>
-              <a:t>Load All Job customer job levels</a:t>
-            </a:r>
-            <a:endParaRPr lang="en-US" dirty="0"/>
-          </a:p>
-        </p:txBody>
-      </p:sp>
-      <p:sp>
-        <p:nvSpPr>
-          <p:cNvPr id="16" name="TextBox 15"/>
-          <p:cNvSpPr txBox="1"/>
-          <p:nvPr/>
-        </p:nvSpPr>
-        <p:spPr>
-          <a:xfrm>
-            <a:off x="329292" y="3042948"/>
-            <a:ext cx="742950" cy="369332"/>
-          </a:xfrm>
-          <a:prstGeom prst="rect">
-            <a:avLst/>
-          </a:prstGeom>
-          <a:noFill/>
-        </p:spPr>
-        <p:txBody>
-          <a:bodyPr wrap="square" rtlCol="0">
-            <a:spAutoFit/>
-          </a:bodyPr>
-          <a:lstStyle/>
-          <a:p>
-            <a:r>
-              <a:rPr lang="en-US" b="1" dirty="0" smtClean="0">
-                <a:solidFill>
-                  <a:srgbClr val="00B0F0"/>
-                </a:solidFill>
-              </a:rPr>
-              <a:t>True</a:t>
-            </a:r>
-            <a:endParaRPr lang="en-US" b="1" dirty="0">
-              <a:solidFill>
-                <a:srgbClr val="00B0F0"/>
-              </a:solidFill>
-            </a:endParaRPr>
-          </a:p>
-        </p:txBody>
-      </p:sp>
-      <p:sp>
-        <p:nvSpPr>
-          <p:cNvPr id="17" name="TextBox 16"/>
-          <p:cNvSpPr txBox="1"/>
-          <p:nvPr/>
-        </p:nvSpPr>
-        <p:spPr>
-          <a:xfrm>
-            <a:off x="2019300" y="2046515"/>
-            <a:ext cx="742950" cy="369332"/>
-          </a:xfrm>
-          <a:prstGeom prst="rect">
-            <a:avLst/>
-          </a:prstGeom>
-          <a:noFill/>
-        </p:spPr>
-        <p:txBody>
-          <a:bodyPr wrap="square" rtlCol="0">
-            <a:spAutoFit/>
-          </a:bodyPr>
-          <a:lstStyle/>
-          <a:p>
-            <a:r>
-              <a:rPr lang="en-US" b="1" dirty="0" smtClean="0">
-                <a:solidFill>
-                  <a:srgbClr val="FF0000"/>
-                </a:solidFill>
-              </a:rPr>
-              <a:t>False</a:t>
-            </a:r>
-            <a:endParaRPr lang="en-US" b="1" dirty="0">
-              <a:solidFill>
-                <a:srgbClr val="FF0000"/>
-              </a:solidFill>
-            </a:endParaRPr>
-          </a:p>
-        </p:txBody>
-      </p:sp>
-      <p:sp>
-        <p:nvSpPr>
-          <p:cNvPr id="20" name="Rectangle 19"/>
-          <p:cNvSpPr/>
-          <p:nvPr/>
-        </p:nvSpPr>
-        <p:spPr>
-          <a:xfrm>
-            <a:off x="6134100" y="2046515"/>
-            <a:ext cx="2133600" cy="762000"/>
-          </a:xfrm>
-          <a:prstGeom prst="rect">
-            <a:avLst/>
-          </a:prstGeom>
-        </p:spPr>
-        <p:style>
-          <a:lnRef idx="2">
-            <a:schemeClr val="accent1">
-              <a:shade val="50000"/>
-            </a:schemeClr>
-          </a:lnRef>
-          <a:fillRef idx="1">
-            <a:schemeClr val="accent1"/>
-          </a:fillRef>
-          <a:effectRef idx="0">
-            <a:schemeClr val="accent1"/>
-          </a:effectRef>
-          <a:fontRef idx="minor">
-            <a:schemeClr val="lt1"/>
-          </a:fontRef>
-        </p:style>
-        <p:txBody>
-          <a:bodyPr rtlCol="0" anchor="ctr"/>
-          <a:lstStyle/>
-          <a:p>
-            <a:pPr algn="ctr"/>
-            <a:r>
-              <a:rPr lang="en-US" dirty="0" smtClean="0"/>
-              <a:t>Add new task into job</a:t>
-            </a:r>
-            <a:endParaRPr lang="en-US" dirty="0"/>
-          </a:p>
-        </p:txBody>
-      </p:sp>
-      <p:cxnSp>
-        <p:nvCxnSpPr>
-          <p:cNvPr id="21" name="Straight Arrow Connector 20"/>
-          <p:cNvCxnSpPr>
-            <a:stCxn id="15" idx="3"/>
-            <a:endCxn id="20" idx="1"/>
-          </p:cNvCxnSpPr>
-          <p:nvPr/>
-        </p:nvCxnSpPr>
-        <p:spPr>
-          <a:xfrm flipV="1">
-            <a:off x="5105400" y="2427515"/>
-            <a:ext cx="1028700" cy="21771"/>
+          <a:xfrm flipH="1" flipV="1">
+            <a:off x="4735286" y="1284514"/>
+            <a:ext cx="2427514" cy="609600"/>
           </a:xfrm>
           <a:prstGeom prst="straightConnector1">
             <a:avLst/>
@@ -3537,17 +3433,17 @@
       </p:cxnSp>
       <p:cxnSp>
         <p:nvCxnSpPr>
-          <p:cNvPr id="24" name="Straight Arrow Connector 23"/>
+          <p:cNvPr id="21" name="Straight Arrow Connector 20"/>
           <p:cNvCxnSpPr>
-            <a:stCxn id="20" idx="2"/>
-            <a:endCxn id="5" idx="0"/>
+            <a:stCxn id="5" idx="2"/>
+            <a:endCxn id="38" idx="0"/>
           </p:cNvCxnSpPr>
           <p:nvPr/>
         </p:nvCxnSpPr>
         <p:spPr>
           <a:xfrm>
-            <a:off x="7200900" y="2808515"/>
-            <a:ext cx="0" cy="2977242"/>
+            <a:off x="1828800" y="2514600"/>
+            <a:ext cx="0" cy="1815568"/>
           </a:xfrm>
           <a:prstGeom prst="straightConnector1">
             <a:avLst/>
@@ -3571,18 +3467,90 @@
           </a:fontRef>
         </p:style>
       </p:cxnSp>
-      <p:sp>
-        <p:nvSpPr>
-          <p:cNvPr id="32" name="Diamond 31"/>
+      <p:cxnSp>
+        <p:nvCxnSpPr>
+          <p:cNvPr id="23" name="Straight Arrow Connector 22"/>
+          <p:cNvCxnSpPr>
+            <a:stCxn id="6" idx="2"/>
+            <a:endCxn id="42" idx="0"/>
+          </p:cNvCxnSpPr>
+          <p:nvPr/>
+        </p:nvCxnSpPr>
+        <p:spPr>
+          <a:xfrm>
+            <a:off x="4735286" y="2503714"/>
+            <a:ext cx="10886" cy="1826454"/>
+          </a:xfrm>
+          <a:prstGeom prst="straightConnector1">
+            <a:avLst/>
+          </a:prstGeom>
+          <a:ln>
+            <a:tailEnd type="arrow"/>
+          </a:ln>
+        </p:spPr>
+        <p:style>
+          <a:lnRef idx="1">
+            <a:schemeClr val="accent1"/>
+          </a:lnRef>
+          <a:fillRef idx="0">
+            <a:schemeClr val="accent1"/>
+          </a:fillRef>
+          <a:effectRef idx="0">
+            <a:schemeClr val="accent1"/>
+          </a:effectRef>
+          <a:fontRef idx="minor">
+            <a:schemeClr val="tx1"/>
+          </a:fontRef>
+        </p:style>
+      </p:cxnSp>
+      <p:cxnSp>
+        <p:nvCxnSpPr>
+          <p:cNvPr id="25" name="Straight Arrow Connector 24"/>
+          <p:cNvCxnSpPr>
+            <a:stCxn id="8" idx="2"/>
+            <a:endCxn id="44" idx="0"/>
+          </p:cNvCxnSpPr>
+          <p:nvPr/>
+        </p:nvCxnSpPr>
+        <p:spPr>
+          <a:xfrm>
+            <a:off x="7162800" y="2503714"/>
+            <a:ext cx="32657" cy="1826454"/>
+          </a:xfrm>
+          <a:prstGeom prst="straightConnector1">
+            <a:avLst/>
+          </a:prstGeom>
+          <a:ln>
+            <a:tailEnd type="arrow"/>
+          </a:ln>
+        </p:spPr>
+        <p:style>
+          <a:lnRef idx="1">
+            <a:schemeClr val="accent1"/>
+          </a:lnRef>
+          <a:fillRef idx="0">
+            <a:schemeClr val="accent1"/>
+          </a:fillRef>
+          <a:effectRef idx="0">
+            <a:schemeClr val="accent1"/>
+          </a:effectRef>
+          <a:fontRef idx="minor">
+            <a:schemeClr val="tx1"/>
+          </a:fontRef>
+        </p:style>
+      </p:cxnSp>
+      <p:sp>
+        <p:nvSpPr>
+          <p:cNvPr id="38" name="Rectangle 37"/>
           <p:cNvSpPr/>
           <p:nvPr/>
         </p:nvSpPr>
         <p:spPr>
           <a:xfrm>
-            <a:off x="179614" y="3581400"/>
-            <a:ext cx="1828800" cy="838200"/>
-          </a:xfrm>
-          <a:prstGeom prst="diamond">
+            <a:off x="914400" y="4330168"/>
+            <a:ext cx="1828800" cy="609600"/>
+          </a:xfrm>
+          <a:prstGeom prst="rect">
             <a:avLst/>
           </a:prstGeom>
         </p:spPr>
@@ -3608,170 +3576,29 @@
           <a:p>
             <a:pPr algn="ctr"/>
             <a:r>
-              <a:rPr lang="en-US" b="1" dirty="0" smtClean="0"/>
-              <a:t>Special task</a:t>
-            </a:r>
-            <a:endParaRPr lang="en-US" b="1" dirty="0"/>
-          </a:p>
-        </p:txBody>
-      </p:sp>
-      <p:cxnSp>
-        <p:nvCxnSpPr>
-          <p:cNvPr id="34" name="Straight Arrow Connector 33"/>
-          <p:cNvCxnSpPr>
-            <a:stCxn id="32" idx="3"/>
-          </p:cNvCxnSpPr>
-          <p:nvPr/>
-        </p:nvCxnSpPr>
-        <p:spPr>
-          <a:xfrm>
-            <a:off x="2008414" y="4000500"/>
-            <a:ext cx="963386" cy="0"/>
-          </a:xfrm>
-          <a:prstGeom prst="straightConnector1">
-            <a:avLst/>
-          </a:prstGeom>
-          <a:ln>
-            <a:tailEnd type="arrow"/>
-          </a:ln>
-        </p:spPr>
-        <p:style>
-          <a:lnRef idx="1">
-            <a:schemeClr val="accent1"/>
-          </a:lnRef>
-          <a:fillRef idx="0">
-            <a:schemeClr val="accent1"/>
-          </a:fillRef>
-          <a:effectRef idx="0">
-            <a:schemeClr val="accent1"/>
-          </a:effectRef>
-          <a:fontRef idx="minor">
-            <a:schemeClr val="tx1"/>
-          </a:fontRef>
-        </p:style>
-      </p:cxnSp>
-      <p:sp>
-        <p:nvSpPr>
-          <p:cNvPr id="35" name="TextBox 34"/>
-          <p:cNvSpPr txBox="1"/>
-          <p:nvPr/>
-        </p:nvSpPr>
-        <p:spPr>
-          <a:xfrm>
-            <a:off x="2134961" y="3613275"/>
-            <a:ext cx="742950" cy="369332"/>
-          </a:xfrm>
-          <a:prstGeom prst="rect">
-            <a:avLst/>
-          </a:prstGeom>
-          <a:noFill/>
-        </p:spPr>
-        <p:txBody>
-          <a:bodyPr wrap="square" rtlCol="0">
-            <a:spAutoFit/>
-          </a:bodyPr>
-          <a:lstStyle/>
-          <a:p>
-            <a:r>
               <a:rPr lang="en-US" b="1" dirty="0" smtClean="0">
-                <a:solidFill>
-                  <a:srgbClr val="00B0F0"/>
-                </a:solidFill>
+                <a:latin typeface="Times New Roman" pitchFamily="18" charset="0"/>
+                <a:cs typeface="Times New Roman" pitchFamily="18" charset="0"/>
               </a:rPr>
-              <a:t>True</a:t>
+              <a:t>Root</a:t>
             </a:r>
             <a:endParaRPr lang="en-US" b="1" dirty="0">
-              <a:solidFill>
-                <a:srgbClr val="00B0F0"/>
-              </a:solidFill>
+              <a:latin typeface="Times New Roman" pitchFamily="18" charset="0"/>
+              <a:cs typeface="Times New Roman" pitchFamily="18" charset="0"/>
             </a:endParaRPr>
           </a:p>
         </p:txBody>
       </p:sp>
-      <p:cxnSp>
-        <p:nvCxnSpPr>
-          <p:cNvPr id="38" name="Straight Arrow Connector 37"/>
-          <p:cNvCxnSpPr>
-            <a:stCxn id="32" idx="2"/>
-            <a:endCxn id="51" idx="0"/>
-          </p:cNvCxnSpPr>
-          <p:nvPr/>
-        </p:nvCxnSpPr>
-        <p:spPr>
-          <a:xfrm>
-            <a:off x="1094014" y="4419600"/>
-            <a:ext cx="1" cy="1366157"/>
-          </a:xfrm>
-          <a:prstGeom prst="straightConnector1">
-            <a:avLst/>
-          </a:prstGeom>
-          <a:ln>
-            <a:tailEnd type="arrow"/>
-          </a:ln>
-        </p:spPr>
-        <p:style>
-          <a:lnRef idx="1">
-            <a:schemeClr val="accent1"/>
-          </a:lnRef>
-          <a:fillRef idx="0">
-            <a:schemeClr val="accent1"/>
-          </a:fillRef>
-          <a:effectRef idx="0">
-            <a:schemeClr val="accent1"/>
-          </a:effectRef>
-          <a:fontRef idx="minor">
-            <a:schemeClr val="tx1"/>
-          </a:fontRef>
-        </p:style>
-      </p:cxnSp>
-      <p:sp>
-        <p:nvSpPr>
-          <p:cNvPr id="39" name="TextBox 38"/>
-          <p:cNvSpPr txBox="1"/>
-          <p:nvPr/>
-        </p:nvSpPr>
-        <p:spPr>
-          <a:xfrm>
-            <a:off x="340178" y="4648199"/>
-            <a:ext cx="742950" cy="369332"/>
-          </a:xfrm>
-          <a:prstGeom prst="rect">
-            <a:avLst/>
-          </a:prstGeom>
-          <a:noFill/>
-        </p:spPr>
-        <p:txBody>
-          <a:bodyPr wrap="square" rtlCol="0">
-            <a:spAutoFit/>
-          </a:bodyPr>
-          <a:lstStyle/>
-          <a:p>
-            <a:r>
-              <a:rPr lang="en-US" b="1" dirty="0" smtClean="0">
-                <a:solidFill>
-                  <a:srgbClr val="FF0000"/>
-                </a:solidFill>
-              </a:rPr>
-              <a:t>False</a:t>
-            </a:r>
-            <a:endParaRPr lang="en-US" b="1" dirty="0">
-              <a:solidFill>
-                <a:srgbClr val="FF0000"/>
-              </a:solidFill>
-            </a:endParaRPr>
-          </a:p>
-        </p:txBody>
-      </p:sp>
-      <p:sp>
-        <p:nvSpPr>
-          <p:cNvPr id="47" name="Rectangle 46"/>
+      <p:sp>
+        <p:nvSpPr>
+          <p:cNvPr id="42" name="Rectangle 41"/>
           <p:cNvSpPr/>
           <p:nvPr/>
         </p:nvSpPr>
         <p:spPr>
           <a:xfrm>
-            <a:off x="2971800" y="3619500"/>
-            <a:ext cx="2133600" cy="762000"/>
+            <a:off x="3831772" y="4330168"/>
+            <a:ext cx="1828800" cy="609600"/>
           </a:xfrm>
           <a:prstGeom prst="rect">
             <a:avLst/>
@@ -3799,59 +3626,29 @@
           <a:p>
             <a:pPr algn="ctr"/>
             <a:r>
-              <a:rPr lang="en-US" dirty="0" smtClean="0"/>
-              <a:t>Reject the task by TLA</a:t>
-            </a:r>
-            <a:endParaRPr lang="en-US" dirty="0"/>
-          </a:p>
-        </p:txBody>
-      </p:sp>
-      <p:cxnSp>
-        <p:nvCxnSpPr>
-          <p:cNvPr id="49" name="Elbow Connector 48"/>
-          <p:cNvCxnSpPr>
-            <a:stCxn id="47" idx="3"/>
-            <a:endCxn id="5" idx="2"/>
-          </p:cNvCxnSpPr>
-          <p:nvPr/>
-        </p:nvCxnSpPr>
-        <p:spPr>
-          <a:xfrm>
-            <a:off x="5105400" y="4000500"/>
-            <a:ext cx="1371600" cy="2166257"/>
-          </a:xfrm>
-          <a:prstGeom prst="bentConnector3">
-            <a:avLst/>
-          </a:prstGeom>
-          <a:ln>
-            <a:tailEnd type="arrow"/>
-          </a:ln>
-        </p:spPr>
-        <p:style>
-          <a:lnRef idx="1">
-            <a:schemeClr val="accent1"/>
-          </a:lnRef>
-          <a:fillRef idx="0">
-            <a:schemeClr val="accent1"/>
-          </a:fillRef>
-          <a:effectRef idx="0">
-            <a:schemeClr val="accent1"/>
-          </a:effectRef>
-          <a:fontRef idx="minor">
-            <a:schemeClr val="tx1"/>
-          </a:fontRef>
-        </p:style>
-      </p:cxnSp>
-      <p:sp>
-        <p:nvSpPr>
-          <p:cNvPr id="51" name="Rectangle 50"/>
+              <a:rPr lang="en-US" b="1" dirty="0" smtClean="0">
+                <a:latin typeface="Times New Roman" pitchFamily="18" charset="0"/>
+                <a:cs typeface="Times New Roman" pitchFamily="18" charset="0"/>
+              </a:rPr>
+              <a:t>Root</a:t>
+            </a:r>
+            <a:endParaRPr lang="en-US" b="1" dirty="0">
+              <a:latin typeface="Times New Roman" pitchFamily="18" charset="0"/>
+              <a:cs typeface="Times New Roman" pitchFamily="18" charset="0"/>
+            </a:endParaRPr>
+          </a:p>
+        </p:txBody>
+      </p:sp>
+      <p:sp>
+        <p:nvSpPr>
+          <p:cNvPr id="44" name="Rectangle 43"/>
           <p:cNvSpPr/>
           <p:nvPr/>
         </p:nvSpPr>
         <p:spPr>
           <a:xfrm>
-            <a:off x="168729" y="5785757"/>
-            <a:ext cx="1850571" cy="762000"/>
+            <a:off x="6281057" y="4330168"/>
+            <a:ext cx="1828800" cy="609600"/>
           </a:xfrm>
           <a:prstGeom prst="rect">
             <a:avLst/>
@@ -3879,26 +3676,479 @@
           <a:p>
             <a:pPr algn="ctr"/>
             <a:r>
+              <a:rPr lang="en-US" b="1" dirty="0" smtClean="0">
+                <a:latin typeface="Times New Roman" pitchFamily="18" charset="0"/>
+                <a:cs typeface="Times New Roman" pitchFamily="18" charset="0"/>
+              </a:rPr>
+              <a:t>Root</a:t>
+            </a:r>
+            <a:endParaRPr lang="en-US" b="1" dirty="0">
+              <a:latin typeface="Times New Roman" pitchFamily="18" charset="0"/>
+              <a:cs typeface="Times New Roman" pitchFamily="18" charset="0"/>
+            </a:endParaRPr>
+          </a:p>
+        </p:txBody>
+      </p:sp>
+      <p:sp>
+        <p:nvSpPr>
+          <p:cNvPr id="46" name="Line Callout 1 45"/>
+          <p:cNvSpPr/>
+          <p:nvPr/>
+        </p:nvSpPr>
+        <p:spPr>
+          <a:xfrm>
+            <a:off x="2547257" y="3481277"/>
+            <a:ext cx="925286" cy="545459"/>
+          </a:xfrm>
+          <a:prstGeom prst="borderCallout1">
+            <a:avLst>
+              <a:gd name="adj1" fmla="val 46690"/>
+              <a:gd name="adj2" fmla="val -2451"/>
+              <a:gd name="adj3" fmla="val 150418"/>
+              <a:gd name="adj4" fmla="val -75980"/>
+            </a:avLst>
+          </a:prstGeom>
+        </p:spPr>
+        <p:style>
+          <a:lnRef idx="2">
+            <a:schemeClr val="accent1">
+              <a:shade val="50000"/>
+            </a:schemeClr>
+          </a:lnRef>
+          <a:fillRef idx="1">
+            <a:schemeClr val="accent1"/>
+          </a:fillRef>
+          <a:effectRef idx="0">
+            <a:schemeClr val="accent1"/>
+          </a:effectRef>
+          <a:fontRef idx="minor">
+            <a:schemeClr val="lt1"/>
+          </a:fontRef>
+        </p:style>
+        <p:txBody>
+          <a:bodyPr rtlCol="0" anchor="ctr"/>
+          <a:lstStyle/>
+          <a:p>
+            <a:pPr algn="ctr"/>
+            <a:r>
               <a:rPr lang="en-US" dirty="0" smtClean="0"/>
-              <a:t>TLA choose local task to reject</a:t>
+              <a:t>TLA</a:t>
             </a:r>
             <a:endParaRPr lang="en-US" dirty="0"/>
+          </a:p>
+        </p:txBody>
+      </p:sp>
+      <p:sp>
+        <p:nvSpPr>
+          <p:cNvPr id="47" name="Line Callout 1 46"/>
+          <p:cNvSpPr/>
+          <p:nvPr/>
+        </p:nvSpPr>
+        <p:spPr>
+          <a:xfrm>
+            <a:off x="5486400" y="3481277"/>
+            <a:ext cx="925286" cy="545459"/>
+          </a:xfrm>
+          <a:prstGeom prst="borderCallout1">
+            <a:avLst>
+              <a:gd name="adj1" fmla="val 46690"/>
+              <a:gd name="adj2" fmla="val -2451"/>
+              <a:gd name="adj3" fmla="val 150418"/>
+              <a:gd name="adj4" fmla="val -75980"/>
+            </a:avLst>
+          </a:prstGeom>
+        </p:spPr>
+        <p:style>
+          <a:lnRef idx="2">
+            <a:schemeClr val="accent1">
+              <a:shade val="50000"/>
+            </a:schemeClr>
+          </a:lnRef>
+          <a:fillRef idx="1">
+            <a:schemeClr val="accent1"/>
+          </a:fillRef>
+          <a:effectRef idx="0">
+            <a:schemeClr val="accent1"/>
+          </a:effectRef>
+          <a:fontRef idx="minor">
+            <a:schemeClr val="lt1"/>
+          </a:fontRef>
+        </p:style>
+        <p:txBody>
+          <a:bodyPr rtlCol="0" anchor="ctr"/>
+          <a:lstStyle/>
+          <a:p>
+            <a:pPr algn="ctr"/>
+            <a:r>
+              <a:rPr lang="en-US" dirty="0" smtClean="0"/>
+              <a:t>TLA</a:t>
+            </a:r>
+            <a:endParaRPr lang="en-US" dirty="0"/>
+          </a:p>
+        </p:txBody>
+      </p:sp>
+      <p:sp>
+        <p:nvSpPr>
+          <p:cNvPr id="48" name="Line Callout 1 47"/>
+          <p:cNvSpPr/>
+          <p:nvPr/>
+        </p:nvSpPr>
+        <p:spPr>
+          <a:xfrm>
+            <a:off x="8049986" y="3465893"/>
+            <a:ext cx="925286" cy="545459"/>
+          </a:xfrm>
+          <a:prstGeom prst="borderCallout1">
+            <a:avLst>
+              <a:gd name="adj1" fmla="val 46690"/>
+              <a:gd name="adj2" fmla="val -2451"/>
+              <a:gd name="adj3" fmla="val 150418"/>
+              <a:gd name="adj4" fmla="val -75980"/>
+            </a:avLst>
+          </a:prstGeom>
+        </p:spPr>
+        <p:style>
+          <a:lnRef idx="2">
+            <a:schemeClr val="accent1">
+              <a:shade val="50000"/>
+            </a:schemeClr>
+          </a:lnRef>
+          <a:fillRef idx="1">
+            <a:schemeClr val="accent1"/>
+          </a:fillRef>
+          <a:effectRef idx="0">
+            <a:schemeClr val="accent1"/>
+          </a:effectRef>
+          <a:fontRef idx="minor">
+            <a:schemeClr val="lt1"/>
+          </a:fontRef>
+        </p:style>
+        <p:txBody>
+          <a:bodyPr rtlCol="0" anchor="ctr"/>
+          <a:lstStyle/>
+          <a:p>
+            <a:pPr algn="ctr"/>
+            <a:r>
+              <a:rPr lang="en-US" dirty="0" smtClean="0"/>
+              <a:t>SALE</a:t>
+            </a:r>
+            <a:endParaRPr lang="en-US" dirty="0"/>
+          </a:p>
+        </p:txBody>
+      </p:sp>
+      <p:sp>
+        <p:nvSpPr>
+          <p:cNvPr id="50" name="Rectangle 49"/>
+          <p:cNvSpPr/>
+          <p:nvPr/>
+        </p:nvSpPr>
+        <p:spPr>
+          <a:xfrm>
+            <a:off x="152400" y="5791200"/>
+            <a:ext cx="1143000" cy="609600"/>
+          </a:xfrm>
+          <a:prstGeom prst="rect">
+            <a:avLst/>
+          </a:prstGeom>
+        </p:spPr>
+        <p:style>
+          <a:lnRef idx="2">
+            <a:schemeClr val="accent1">
+              <a:shade val="50000"/>
+            </a:schemeClr>
+          </a:lnRef>
+          <a:fillRef idx="1">
+            <a:schemeClr val="accent1"/>
+          </a:fillRef>
+          <a:effectRef idx="0">
+            <a:schemeClr val="accent1"/>
+          </a:effectRef>
+          <a:fontRef idx="minor">
+            <a:schemeClr val="lt1"/>
+          </a:fontRef>
+        </p:style>
+        <p:txBody>
+          <a:bodyPr rtlCol="0" anchor="ctr"/>
+          <a:lstStyle/>
+          <a:p>
+            <a:pPr algn="ctr"/>
+            <a:r>
+              <a:rPr lang="en-US" b="1" dirty="0" smtClean="0">
+                <a:latin typeface="Times New Roman" pitchFamily="18" charset="0"/>
+                <a:cs typeface="Times New Roman" pitchFamily="18" charset="0"/>
+              </a:rPr>
+              <a:t>Task 1</a:t>
+            </a:r>
+            <a:endParaRPr lang="en-US" b="1" dirty="0">
+              <a:latin typeface="Times New Roman" pitchFamily="18" charset="0"/>
+              <a:cs typeface="Times New Roman" pitchFamily="18" charset="0"/>
+            </a:endParaRPr>
+          </a:p>
+        </p:txBody>
+      </p:sp>
+      <p:sp>
+        <p:nvSpPr>
+          <p:cNvPr id="51" name="Rectangle 50"/>
+          <p:cNvSpPr/>
+          <p:nvPr/>
+        </p:nvSpPr>
+        <p:spPr>
+          <a:xfrm>
+            <a:off x="1589314" y="5791200"/>
+            <a:ext cx="1143000" cy="609600"/>
+          </a:xfrm>
+          <a:prstGeom prst="rect">
+            <a:avLst/>
+          </a:prstGeom>
+        </p:spPr>
+        <p:style>
+          <a:lnRef idx="2">
+            <a:schemeClr val="accent1">
+              <a:shade val="50000"/>
+            </a:schemeClr>
+          </a:lnRef>
+          <a:fillRef idx="1">
+            <a:schemeClr val="accent1"/>
+          </a:fillRef>
+          <a:effectRef idx="0">
+            <a:schemeClr val="accent1"/>
+          </a:effectRef>
+          <a:fontRef idx="minor">
+            <a:schemeClr val="lt1"/>
+          </a:fontRef>
+        </p:style>
+        <p:txBody>
+          <a:bodyPr rtlCol="0" anchor="ctr"/>
+          <a:lstStyle/>
+          <a:p>
+            <a:pPr algn="ctr"/>
+            <a:r>
+              <a:rPr lang="en-US" b="1" dirty="0" smtClean="0">
+                <a:latin typeface="Times New Roman" pitchFamily="18" charset="0"/>
+                <a:cs typeface="Times New Roman" pitchFamily="18" charset="0"/>
+              </a:rPr>
+              <a:t>Task 2</a:t>
+            </a:r>
+            <a:endParaRPr lang="en-US" b="1" dirty="0">
+              <a:latin typeface="Times New Roman" pitchFamily="18" charset="0"/>
+              <a:cs typeface="Times New Roman" pitchFamily="18" charset="0"/>
+            </a:endParaRPr>
+          </a:p>
+        </p:txBody>
+      </p:sp>
+      <p:sp>
+        <p:nvSpPr>
+          <p:cNvPr id="52" name="Rectangle 51"/>
+          <p:cNvSpPr/>
+          <p:nvPr/>
+        </p:nvSpPr>
+        <p:spPr>
+          <a:xfrm>
+            <a:off x="3282043" y="5791200"/>
+            <a:ext cx="1143000" cy="609600"/>
+          </a:xfrm>
+          <a:prstGeom prst="rect">
+            <a:avLst/>
+          </a:prstGeom>
+        </p:spPr>
+        <p:style>
+          <a:lnRef idx="2">
+            <a:schemeClr val="accent1">
+              <a:shade val="50000"/>
+            </a:schemeClr>
+          </a:lnRef>
+          <a:fillRef idx="1">
+            <a:schemeClr val="accent1"/>
+          </a:fillRef>
+          <a:effectRef idx="0">
+            <a:schemeClr val="accent1"/>
+          </a:effectRef>
+          <a:fontRef idx="minor">
+            <a:schemeClr val="lt1"/>
+          </a:fontRef>
+        </p:style>
+        <p:txBody>
+          <a:bodyPr rtlCol="0" anchor="ctr"/>
+          <a:lstStyle/>
+          <a:p>
+            <a:pPr algn="ctr"/>
+            <a:r>
+              <a:rPr lang="en-US" b="1" dirty="0" smtClean="0">
+                <a:latin typeface="Times New Roman" pitchFamily="18" charset="0"/>
+                <a:cs typeface="Times New Roman" pitchFamily="18" charset="0"/>
+              </a:rPr>
+              <a:t>Task 1</a:t>
+            </a:r>
+            <a:endParaRPr lang="en-US" b="1" dirty="0">
+              <a:latin typeface="Times New Roman" pitchFamily="18" charset="0"/>
+              <a:cs typeface="Times New Roman" pitchFamily="18" charset="0"/>
+            </a:endParaRPr>
+          </a:p>
+        </p:txBody>
+      </p:sp>
+      <p:sp>
+        <p:nvSpPr>
+          <p:cNvPr id="53" name="Rectangle 52"/>
+          <p:cNvSpPr/>
+          <p:nvPr/>
+        </p:nvSpPr>
+        <p:spPr>
+          <a:xfrm>
+            <a:off x="4718957" y="5791200"/>
+            <a:ext cx="1143000" cy="609600"/>
+          </a:xfrm>
+          <a:prstGeom prst="rect">
+            <a:avLst/>
+          </a:prstGeom>
+        </p:spPr>
+        <p:style>
+          <a:lnRef idx="2">
+            <a:schemeClr val="accent1">
+              <a:shade val="50000"/>
+            </a:schemeClr>
+          </a:lnRef>
+          <a:fillRef idx="1">
+            <a:schemeClr val="accent1"/>
+          </a:fillRef>
+          <a:effectRef idx="0">
+            <a:schemeClr val="accent1"/>
+          </a:effectRef>
+          <a:fontRef idx="minor">
+            <a:schemeClr val="lt1"/>
+          </a:fontRef>
+        </p:style>
+        <p:txBody>
+          <a:bodyPr rtlCol="0" anchor="ctr"/>
+          <a:lstStyle/>
+          <a:p>
+            <a:pPr algn="ctr"/>
+            <a:r>
+              <a:rPr lang="en-US" b="1" dirty="0" smtClean="0">
+                <a:latin typeface="Times New Roman" pitchFamily="18" charset="0"/>
+                <a:cs typeface="Times New Roman" pitchFamily="18" charset="0"/>
+              </a:rPr>
+              <a:t>Task 2</a:t>
+            </a:r>
+            <a:endParaRPr lang="en-US" b="1" dirty="0">
+              <a:latin typeface="Times New Roman" pitchFamily="18" charset="0"/>
+              <a:cs typeface="Times New Roman" pitchFamily="18" charset="0"/>
+            </a:endParaRPr>
+          </a:p>
+        </p:txBody>
+      </p:sp>
+      <p:sp>
+        <p:nvSpPr>
+          <p:cNvPr id="54" name="Rectangle 53"/>
+          <p:cNvSpPr/>
+          <p:nvPr/>
+        </p:nvSpPr>
+        <p:spPr>
+          <a:xfrm>
+            <a:off x="6218465" y="5769429"/>
+            <a:ext cx="1143000" cy="609600"/>
+          </a:xfrm>
+          <a:prstGeom prst="rect">
+            <a:avLst/>
+          </a:prstGeom>
+        </p:spPr>
+        <p:style>
+          <a:lnRef idx="2">
+            <a:schemeClr val="accent1">
+              <a:shade val="50000"/>
+            </a:schemeClr>
+          </a:lnRef>
+          <a:fillRef idx="1">
+            <a:schemeClr val="accent1"/>
+          </a:fillRef>
+          <a:effectRef idx="0">
+            <a:schemeClr val="accent1"/>
+          </a:effectRef>
+          <a:fontRef idx="minor">
+            <a:schemeClr val="lt1"/>
+          </a:fontRef>
+        </p:style>
+        <p:txBody>
+          <a:bodyPr rtlCol="0" anchor="ctr"/>
+          <a:lstStyle/>
+          <a:p>
+            <a:pPr algn="ctr"/>
+            <a:r>
+              <a:rPr lang="en-US" b="1" dirty="0" smtClean="0">
+                <a:latin typeface="Times New Roman" pitchFamily="18" charset="0"/>
+                <a:cs typeface="Times New Roman" pitchFamily="18" charset="0"/>
+              </a:rPr>
+              <a:t>Task 1</a:t>
+            </a:r>
+            <a:endParaRPr lang="en-US" b="1" dirty="0">
+              <a:latin typeface="Times New Roman" pitchFamily="18" charset="0"/>
+              <a:cs typeface="Times New Roman" pitchFamily="18" charset="0"/>
+            </a:endParaRPr>
+          </a:p>
+        </p:txBody>
+      </p:sp>
+      <p:sp>
+        <p:nvSpPr>
+          <p:cNvPr id="55" name="Rectangle 54"/>
+          <p:cNvSpPr/>
+          <p:nvPr/>
+        </p:nvSpPr>
+        <p:spPr>
+          <a:xfrm>
+            <a:off x="7655379" y="5769429"/>
+            <a:ext cx="1143000" cy="609600"/>
+          </a:xfrm>
+          <a:prstGeom prst="rect">
+            <a:avLst/>
+          </a:prstGeom>
+        </p:spPr>
+        <p:style>
+          <a:lnRef idx="2">
+            <a:schemeClr val="accent1">
+              <a:shade val="50000"/>
+            </a:schemeClr>
+          </a:lnRef>
+          <a:fillRef idx="1">
+            <a:schemeClr val="accent1"/>
+          </a:fillRef>
+          <a:effectRef idx="0">
+            <a:schemeClr val="accent1"/>
+          </a:effectRef>
+          <a:fontRef idx="minor">
+            <a:schemeClr val="lt1"/>
+          </a:fontRef>
+        </p:style>
+        <p:txBody>
+          <a:bodyPr rtlCol="0" anchor="ctr"/>
+          <a:lstStyle/>
+          <a:p>
+            <a:pPr algn="ctr"/>
+            <a:r>
+              <a:rPr lang="en-US" b="1" dirty="0" smtClean="0">
+                <a:latin typeface="Times New Roman" pitchFamily="18" charset="0"/>
+                <a:cs typeface="Times New Roman" pitchFamily="18" charset="0"/>
+              </a:rPr>
+              <a:t>Task 2</a:t>
+            </a:r>
+            <a:endParaRPr lang="en-US" b="1" dirty="0">
+              <a:latin typeface="Times New Roman" pitchFamily="18" charset="0"/>
+              <a:cs typeface="Times New Roman" pitchFamily="18" charset="0"/>
+            </a:endParaRPr>
           </a:p>
         </p:txBody>
       </p:sp>
       <p:cxnSp>
         <p:nvCxnSpPr>
-          <p:cNvPr id="53" name="Straight Arrow Connector 52"/>
+          <p:cNvPr id="57" name="Straight Arrow Connector 56"/>
           <p:cNvCxnSpPr>
-            <a:stCxn id="51" idx="3"/>
-            <a:endCxn id="5" idx="2"/>
+            <a:stCxn id="50" idx="0"/>
+            <a:endCxn id="38" idx="2"/>
           </p:cNvCxnSpPr>
           <p:nvPr/>
         </p:nvCxnSpPr>
         <p:spPr>
-          <a:xfrm>
-            <a:off x="2019300" y="6166757"/>
-            <a:ext cx="4457700" cy="0"/>
+          <a:xfrm flipV="1">
+            <a:off x="723900" y="4939768"/>
+            <a:ext cx="1104900" cy="851432"/>
           </a:xfrm>
           <a:prstGeom prst="straightConnector1">
             <a:avLst/>
@@ -3922,10 +4172,337 @@
           </a:fontRef>
         </p:style>
       </p:cxnSp>
+      <p:cxnSp>
+        <p:nvCxnSpPr>
+          <p:cNvPr id="59" name="Straight Arrow Connector 58"/>
+          <p:cNvCxnSpPr>
+            <a:stCxn id="51" idx="0"/>
+            <a:endCxn id="38" idx="2"/>
+          </p:cNvCxnSpPr>
+          <p:nvPr/>
+        </p:nvCxnSpPr>
+        <p:spPr>
+          <a:xfrm flipH="1" flipV="1">
+            <a:off x="1828800" y="4939768"/>
+            <a:ext cx="332014" cy="851432"/>
+          </a:xfrm>
+          <a:prstGeom prst="straightConnector1">
+            <a:avLst/>
+          </a:prstGeom>
+          <a:ln>
+            <a:tailEnd type="arrow"/>
+          </a:ln>
+        </p:spPr>
+        <p:style>
+          <a:lnRef idx="1">
+            <a:schemeClr val="accent1"/>
+          </a:lnRef>
+          <a:fillRef idx="0">
+            <a:schemeClr val="accent1"/>
+          </a:fillRef>
+          <a:effectRef idx="0">
+            <a:schemeClr val="accent1"/>
+          </a:effectRef>
+          <a:fontRef idx="minor">
+            <a:schemeClr val="tx1"/>
+          </a:fontRef>
+        </p:style>
+      </p:cxnSp>
+      <p:cxnSp>
+        <p:nvCxnSpPr>
+          <p:cNvPr id="61" name="Straight Arrow Connector 60"/>
+          <p:cNvCxnSpPr>
+            <a:stCxn id="52" idx="0"/>
+            <a:endCxn id="42" idx="2"/>
+          </p:cNvCxnSpPr>
+          <p:nvPr/>
+        </p:nvCxnSpPr>
+        <p:spPr>
+          <a:xfrm flipV="1">
+            <a:off x="3853543" y="4939768"/>
+            <a:ext cx="892629" cy="851432"/>
+          </a:xfrm>
+          <a:prstGeom prst="straightConnector1">
+            <a:avLst/>
+          </a:prstGeom>
+          <a:ln>
+            <a:tailEnd type="arrow"/>
+          </a:ln>
+        </p:spPr>
+        <p:style>
+          <a:lnRef idx="1">
+            <a:schemeClr val="accent1"/>
+          </a:lnRef>
+          <a:fillRef idx="0">
+            <a:schemeClr val="accent1"/>
+          </a:fillRef>
+          <a:effectRef idx="0">
+            <a:schemeClr val="accent1"/>
+          </a:effectRef>
+          <a:fontRef idx="minor">
+            <a:schemeClr val="tx1"/>
+          </a:fontRef>
+        </p:style>
+      </p:cxnSp>
+      <p:cxnSp>
+        <p:nvCxnSpPr>
+          <p:cNvPr id="63" name="Straight Arrow Connector 62"/>
+          <p:cNvCxnSpPr>
+            <a:stCxn id="53" idx="0"/>
+            <a:endCxn id="42" idx="2"/>
+          </p:cNvCxnSpPr>
+          <p:nvPr/>
+        </p:nvCxnSpPr>
+        <p:spPr>
+          <a:xfrm flipH="1" flipV="1">
+            <a:off x="4746172" y="4939768"/>
+            <a:ext cx="544285" cy="851432"/>
+          </a:xfrm>
+          <a:prstGeom prst="straightConnector1">
+            <a:avLst/>
+          </a:prstGeom>
+          <a:ln>
+            <a:tailEnd type="arrow"/>
+          </a:ln>
+        </p:spPr>
+        <p:style>
+          <a:lnRef idx="1">
+            <a:schemeClr val="accent1"/>
+          </a:lnRef>
+          <a:fillRef idx="0">
+            <a:schemeClr val="accent1"/>
+          </a:fillRef>
+          <a:effectRef idx="0">
+            <a:schemeClr val="accent1"/>
+          </a:effectRef>
+          <a:fontRef idx="minor">
+            <a:schemeClr val="tx1"/>
+          </a:fontRef>
+        </p:style>
+      </p:cxnSp>
+      <p:cxnSp>
+        <p:nvCxnSpPr>
+          <p:cNvPr id="65" name="Straight Arrow Connector 64"/>
+          <p:cNvCxnSpPr>
+            <a:stCxn id="54" idx="0"/>
+            <a:endCxn id="44" idx="2"/>
+          </p:cNvCxnSpPr>
+          <p:nvPr/>
+        </p:nvCxnSpPr>
+        <p:spPr>
+          <a:xfrm flipV="1">
+            <a:off x="6789965" y="4939768"/>
+            <a:ext cx="405492" cy="829661"/>
+          </a:xfrm>
+          <a:prstGeom prst="straightConnector1">
+            <a:avLst/>
+          </a:prstGeom>
+          <a:ln>
+            <a:tailEnd type="arrow"/>
+          </a:ln>
+        </p:spPr>
+        <p:style>
+          <a:lnRef idx="1">
+            <a:schemeClr val="accent1"/>
+          </a:lnRef>
+          <a:fillRef idx="0">
+            <a:schemeClr val="accent1"/>
+          </a:fillRef>
+          <a:effectRef idx="0">
+            <a:schemeClr val="accent1"/>
+          </a:effectRef>
+          <a:fontRef idx="minor">
+            <a:schemeClr val="tx1"/>
+          </a:fontRef>
+        </p:style>
+      </p:cxnSp>
+      <p:cxnSp>
+        <p:nvCxnSpPr>
+          <p:cNvPr id="67" name="Straight Arrow Connector 66"/>
+          <p:cNvCxnSpPr>
+            <a:stCxn id="55" idx="0"/>
+            <a:endCxn id="44" idx="2"/>
+          </p:cNvCxnSpPr>
+          <p:nvPr/>
+        </p:nvCxnSpPr>
+        <p:spPr>
+          <a:xfrm flipH="1" flipV="1">
+            <a:off x="7195457" y="4939768"/>
+            <a:ext cx="1031422" cy="829661"/>
+          </a:xfrm>
+          <a:prstGeom prst="straightConnector1">
+            <a:avLst/>
+          </a:prstGeom>
+          <a:ln>
+            <a:tailEnd type="arrow"/>
+          </a:ln>
+        </p:spPr>
+        <p:style>
+          <a:lnRef idx="1">
+            <a:schemeClr val="accent1"/>
+          </a:lnRef>
+          <a:fillRef idx="0">
+            <a:schemeClr val="accent1"/>
+          </a:fillRef>
+          <a:effectRef idx="0">
+            <a:schemeClr val="accent1"/>
+          </a:effectRef>
+          <a:fontRef idx="minor">
+            <a:schemeClr val="tx1"/>
+          </a:fontRef>
+        </p:style>
+      </p:cxnSp>
+      <p:sp>
+        <p:nvSpPr>
+          <p:cNvPr id="71" name="Line Callout 1 70"/>
+          <p:cNvSpPr/>
+          <p:nvPr/>
+        </p:nvSpPr>
+        <p:spPr>
+          <a:xfrm>
+            <a:off x="152400" y="1043855"/>
+            <a:ext cx="925286" cy="545459"/>
+          </a:xfrm>
+          <a:prstGeom prst="borderCallout1">
+            <a:avLst>
+              <a:gd name="adj1" fmla="val 56669"/>
+              <a:gd name="adj2" fmla="val 101078"/>
+              <a:gd name="adj3" fmla="val 156405"/>
+              <a:gd name="adj4" fmla="val 187550"/>
+            </a:avLst>
+          </a:prstGeom>
+        </p:spPr>
+        <p:style>
+          <a:lnRef idx="2">
+            <a:schemeClr val="accent1">
+              <a:shade val="50000"/>
+            </a:schemeClr>
+          </a:lnRef>
+          <a:fillRef idx="1">
+            <a:schemeClr val="accent1"/>
+          </a:fillRef>
+          <a:effectRef idx="0">
+            <a:schemeClr val="accent1"/>
+          </a:effectRef>
+          <a:fontRef idx="minor">
+            <a:schemeClr val="lt1"/>
+          </a:fontRef>
+        </p:style>
+        <p:txBody>
+          <a:bodyPr rtlCol="0" anchor="ctr"/>
+          <a:lstStyle/>
+          <a:p>
+            <a:pPr algn="ctr"/>
+            <a:r>
+              <a:rPr lang="en-US" dirty="0" smtClean="0"/>
+              <a:t>Fee</a:t>
+            </a:r>
+            <a:endParaRPr lang="en-US" dirty="0"/>
+          </a:p>
+        </p:txBody>
+      </p:sp>
+      <p:sp>
+        <p:nvSpPr>
+          <p:cNvPr id="72" name="Line Callout 1 71"/>
+          <p:cNvSpPr/>
+          <p:nvPr/>
+        </p:nvSpPr>
+        <p:spPr>
+          <a:xfrm>
+            <a:off x="2732314" y="2743200"/>
+            <a:ext cx="925286" cy="545459"/>
+          </a:xfrm>
+          <a:prstGeom prst="borderCallout1">
+            <a:avLst>
+              <a:gd name="adj1" fmla="val 56669"/>
+              <a:gd name="adj2" fmla="val 101078"/>
+              <a:gd name="adj3" fmla="val -39173"/>
+              <a:gd name="adj4" fmla="val 216962"/>
+            </a:avLst>
+          </a:prstGeom>
+        </p:spPr>
+        <p:style>
+          <a:lnRef idx="2">
+            <a:schemeClr val="accent1">
+              <a:shade val="50000"/>
+            </a:schemeClr>
+          </a:lnRef>
+          <a:fillRef idx="1">
+            <a:schemeClr val="accent1"/>
+          </a:fillRef>
+          <a:effectRef idx="0">
+            <a:schemeClr val="accent1"/>
+          </a:effectRef>
+          <a:fontRef idx="minor">
+            <a:schemeClr val="lt1"/>
+          </a:fontRef>
+        </p:style>
+        <p:txBody>
+          <a:bodyPr rtlCol="0" anchor="ctr"/>
+          <a:lstStyle/>
+          <a:p>
+            <a:pPr algn="ctr"/>
+            <a:r>
+              <a:rPr lang="en-US" dirty="0" smtClean="0"/>
+              <a:t>No Fee</a:t>
+            </a:r>
+            <a:endParaRPr lang="en-US" dirty="0"/>
+          </a:p>
+        </p:txBody>
+      </p:sp>
+      <p:sp>
+        <p:nvSpPr>
+          <p:cNvPr id="73" name="Line Callout 1 72"/>
+          <p:cNvSpPr/>
+          <p:nvPr/>
+        </p:nvSpPr>
+        <p:spPr>
+          <a:xfrm>
+            <a:off x="5148943" y="2743199"/>
+            <a:ext cx="925286" cy="545459"/>
+          </a:xfrm>
+          <a:prstGeom prst="borderCallout1">
+            <a:avLst>
+              <a:gd name="adj1" fmla="val 56669"/>
+              <a:gd name="adj2" fmla="val 101078"/>
+              <a:gd name="adj3" fmla="val -39173"/>
+              <a:gd name="adj4" fmla="val 216962"/>
+            </a:avLst>
+          </a:prstGeom>
+        </p:spPr>
+        <p:style>
+          <a:lnRef idx="2">
+            <a:schemeClr val="accent1">
+              <a:shade val="50000"/>
+            </a:schemeClr>
+          </a:lnRef>
+          <a:fillRef idx="1">
+            <a:schemeClr val="accent1"/>
+          </a:fillRef>
+          <a:effectRef idx="0">
+            <a:schemeClr val="accent1"/>
+          </a:effectRef>
+          <a:fontRef idx="minor">
+            <a:schemeClr val="lt1"/>
+          </a:fontRef>
+        </p:style>
+        <p:txBody>
+          <a:bodyPr rtlCol="0" anchor="ctr"/>
+          <a:lstStyle/>
+          <a:p>
+            <a:pPr algn="ctr"/>
+            <a:r>
+              <a:rPr lang="en-US" dirty="0" smtClean="0"/>
+              <a:t>No Fee</a:t>
+            </a:r>
+            <a:endParaRPr lang="en-US" dirty="0"/>
+          </a:p>
+        </p:txBody>
+      </p:sp>
     </p:spTree>
     <p:extLst>
       <p:ext uri="{BB962C8B-B14F-4D97-AF65-F5344CB8AC3E}">
-        <p14:creationId xmlns:p14="http://schemas.microsoft.com/office/powerpoint/2010/main" val="1256810049"/>
+        <p14:creationId xmlns:p14="http://schemas.microsoft.com/office/powerpoint/2010/main" val="307235104"/>
       </p:ext>
     </p:extLst>
   </p:cSld>

</xml_diff>